<commit_message>
n3c & health economics
</commit_message>
<xml_diff>
--- a/publications/presentation-2021-04-oumbi/crdw-2021-04.pptx
+++ b/publications/presentation-2021-04-oumbi/crdw-2021-04.pptx
@@ -5,7 +5,7 @@
     <p:sldMasterId id="2147483648" r:id="rId1"/>
   </p:sldMasterIdLst>
   <p:notesMasterIdLst>
-    <p:notesMasterId r:id="rId22"/>
+    <p:notesMasterId r:id="rId24"/>
   </p:notesMasterIdLst>
   <p:sldIdLst>
     <p:sldId id="292" r:id="rId2"/>
@@ -24,10 +24,12 @@
     <p:sldId id="428" r:id="rId15"/>
     <p:sldId id="423" r:id="rId16"/>
     <p:sldId id="401" r:id="rId17"/>
-    <p:sldId id="390" r:id="rId18"/>
-    <p:sldId id="367" r:id="rId19"/>
-    <p:sldId id="296" r:id="rId20"/>
-    <p:sldId id="340" r:id="rId21"/>
+    <p:sldId id="429" r:id="rId18"/>
+    <p:sldId id="430" r:id="rId19"/>
+    <p:sldId id="390" r:id="rId20"/>
+    <p:sldId id="367" r:id="rId21"/>
+    <p:sldId id="296" r:id="rId22"/>
+    <p:sldId id="340" r:id="rId23"/>
   </p:sldIdLst>
   <p:sldSz cx="12192000" cy="6858000"/>
   <p:notesSz cx="6858000" cy="9144000"/>
@@ -7223,27 +7225,18 @@
           <a:bodyPr/>
           <a:lstStyle/>
           <a:p>
-            <a:fld id="{795E7D87-CD48-43C8-A7EA-8D4BB480ED50}" type="slidenum">
-              <a:rPr lang="en-US" smtClean="0">
-                <a:solidFill>
-                  <a:prstClr val="black"/>
-                </a:solidFill>
-              </a:rPr>
-              <a:pPr/>
-              <a:t>18</a:t>
+            <a:fld id="{372B4D55-8C27-4C2C-B1CD-E79AEC43B316}" type="slidenum">
+              <a:rPr lang="en-US" smtClean="0"/>
+              <a:t>17</a:t>
             </a:fld>
-            <a:endParaRPr lang="en-US">
-              <a:solidFill>
-                <a:prstClr val="black"/>
-              </a:solidFill>
-            </a:endParaRPr>
+            <a:endParaRPr lang="en-US"/>
           </a:p>
         </p:txBody>
       </p:sp>
     </p:spTree>
     <p:extLst>
       <p:ext uri="{BB962C8B-B14F-4D97-AF65-F5344CB8AC3E}">
-        <p14:creationId xmlns:p14="http://schemas.microsoft.com/office/powerpoint/2010/main" val="3342317537"/>
+        <p14:creationId xmlns:p14="http://schemas.microsoft.com/office/powerpoint/2010/main" val="3372492429"/>
       </p:ext>
     </p:extLst>
   </p:cSld>
@@ -7297,23 +7290,6 @@
           <a:bodyPr/>
           <a:lstStyle/>
           <a:p>
-            <a:r>
-              <a:rPr lang="en-US" dirty="0"/>
-              <a:t>In short, we work closely with the oversight boards to</a:t>
-            </a:r>
-            <a:r>
-              <a:rPr lang="en-US" baseline="0" dirty="0"/>
-              <a:t> maintain compliance &amp; improve efficiency.  A new governance board is being created that’s co-chair by the informatics heads of the hospital and of the clinics.  I’m excited that this will speed up parts of our process for those studies that don’t require an IRB.</a:t>
-            </a:r>
-          </a:p>
-          <a:p>
-            <a:endParaRPr lang="en-US" baseline="0" dirty="0"/>
-          </a:p>
-          <a:p>
-            <a:r>
-              <a:rPr lang="en-US" baseline="0" dirty="0"/>
-              <a:t>[8 min cumulative]</a:t>
-            </a:r>
             <a:endParaRPr lang="en-US" dirty="0"/>
           </a:p>
         </p:txBody>
@@ -7335,7 +7311,201 @@
           <a:p>
             <a:fld id="{372B4D55-8C27-4C2C-B1CD-E79AEC43B316}" type="slidenum">
               <a:rPr lang="en-US" smtClean="0"/>
+              <a:t>18</a:t>
+            </a:fld>
+            <a:endParaRPr lang="en-US"/>
+          </a:p>
+        </p:txBody>
+      </p:sp>
+    </p:spTree>
+    <p:extLst>
+      <p:ext uri="{BB962C8B-B14F-4D97-AF65-F5344CB8AC3E}">
+        <p14:creationId xmlns:p14="http://schemas.microsoft.com/office/powerpoint/2010/main" val="2711185950"/>
+      </p:ext>
+    </p:extLst>
+  </p:cSld>
+  <p:clrMapOvr>
+    <a:masterClrMapping/>
+  </p:clrMapOvr>
+</p:notes>
+</file>
+
+<file path=ppt/notesSlides/notesSlide12.xml><?xml version="1.0" encoding="utf-8"?>
+<p:notes xmlns:a="http://schemas.openxmlformats.org/drawingml/2006/main" xmlns:r="http://schemas.openxmlformats.org/officeDocument/2006/relationships" xmlns:p="http://schemas.openxmlformats.org/presentationml/2006/main">
+  <p:cSld>
+    <p:spTree>
+      <p:nvGrpSpPr>
+        <p:cNvPr id="1" name=""/>
+        <p:cNvGrpSpPr/>
+        <p:nvPr/>
+      </p:nvGrpSpPr>
+      <p:grpSpPr>
+        <a:xfrm>
+          <a:off x="0" y="0"/>
+          <a:ext cx="0" cy="0"/>
+          <a:chOff x="0" y="0"/>
+          <a:chExt cx="0" cy="0"/>
+        </a:xfrm>
+      </p:grpSpPr>
+      <p:sp>
+        <p:nvSpPr>
+          <p:cNvPr id="2" name="Slide Image Placeholder 1"/>
+          <p:cNvSpPr>
+            <a:spLocks noGrp="1" noRot="1" noChangeAspect="1"/>
+          </p:cNvSpPr>
+          <p:nvPr>
+            <p:ph type="sldImg"/>
+          </p:nvPr>
+        </p:nvSpPr>
+        <p:spPr/>
+      </p:sp>
+      <p:sp>
+        <p:nvSpPr>
+          <p:cNvPr id="3" name="Notes Placeholder 2"/>
+          <p:cNvSpPr>
+            <a:spLocks noGrp="1"/>
+          </p:cNvSpPr>
+          <p:nvPr>
+            <p:ph type="body" idx="1"/>
+          </p:nvPr>
+        </p:nvSpPr>
+        <p:spPr/>
+        <p:txBody>
+          <a:bodyPr/>
+          <a:lstStyle/>
+          <a:p>
+            <a:endParaRPr lang="en-US" dirty="0"/>
+          </a:p>
+        </p:txBody>
+      </p:sp>
+      <p:sp>
+        <p:nvSpPr>
+          <p:cNvPr id="4" name="Slide Number Placeholder 3"/>
+          <p:cNvSpPr>
+            <a:spLocks noGrp="1"/>
+          </p:cNvSpPr>
+          <p:nvPr>
+            <p:ph type="sldNum" sz="quarter" idx="10"/>
+          </p:nvPr>
+        </p:nvSpPr>
+        <p:spPr/>
+        <p:txBody>
+          <a:bodyPr/>
+          <a:lstStyle/>
+          <a:p>
+            <a:fld id="{795E7D87-CD48-43C8-A7EA-8D4BB480ED50}" type="slidenum">
+              <a:rPr lang="en-US" smtClean="0">
+                <a:solidFill>
+                  <a:prstClr val="black"/>
+                </a:solidFill>
+              </a:rPr>
+              <a:pPr/>
               <a:t>20</a:t>
+            </a:fld>
+            <a:endParaRPr lang="en-US">
+              <a:solidFill>
+                <a:prstClr val="black"/>
+              </a:solidFill>
+            </a:endParaRPr>
+          </a:p>
+        </p:txBody>
+      </p:sp>
+    </p:spTree>
+    <p:extLst>
+      <p:ext uri="{BB962C8B-B14F-4D97-AF65-F5344CB8AC3E}">
+        <p14:creationId xmlns:p14="http://schemas.microsoft.com/office/powerpoint/2010/main" val="3342317537"/>
+      </p:ext>
+    </p:extLst>
+  </p:cSld>
+  <p:clrMapOvr>
+    <a:masterClrMapping/>
+  </p:clrMapOvr>
+</p:notes>
+</file>
+
+<file path=ppt/notesSlides/notesSlide13.xml><?xml version="1.0" encoding="utf-8"?>
+<p:notes xmlns:a="http://schemas.openxmlformats.org/drawingml/2006/main" xmlns:r="http://schemas.openxmlformats.org/officeDocument/2006/relationships" xmlns:p="http://schemas.openxmlformats.org/presentationml/2006/main">
+  <p:cSld>
+    <p:spTree>
+      <p:nvGrpSpPr>
+        <p:cNvPr id="1" name=""/>
+        <p:cNvGrpSpPr/>
+        <p:nvPr/>
+      </p:nvGrpSpPr>
+      <p:grpSpPr>
+        <a:xfrm>
+          <a:off x="0" y="0"/>
+          <a:ext cx="0" cy="0"/>
+          <a:chOff x="0" y="0"/>
+          <a:chExt cx="0" cy="0"/>
+        </a:xfrm>
+      </p:grpSpPr>
+      <p:sp>
+        <p:nvSpPr>
+          <p:cNvPr id="2" name="Slide Image Placeholder 1"/>
+          <p:cNvSpPr>
+            <a:spLocks noGrp="1" noRot="1" noChangeAspect="1"/>
+          </p:cNvSpPr>
+          <p:nvPr>
+            <p:ph type="sldImg"/>
+          </p:nvPr>
+        </p:nvSpPr>
+        <p:spPr/>
+      </p:sp>
+      <p:sp>
+        <p:nvSpPr>
+          <p:cNvPr id="3" name="Notes Placeholder 2"/>
+          <p:cNvSpPr>
+            <a:spLocks noGrp="1"/>
+          </p:cNvSpPr>
+          <p:nvPr>
+            <p:ph type="body" idx="1"/>
+          </p:nvPr>
+        </p:nvSpPr>
+        <p:spPr/>
+        <p:txBody>
+          <a:bodyPr/>
+          <a:lstStyle/>
+          <a:p>
+            <a:r>
+              <a:rPr lang="en-US" dirty="0"/>
+              <a:t>In short, we work closely with the oversight boards to</a:t>
+            </a:r>
+            <a:r>
+              <a:rPr lang="en-US" baseline="0" dirty="0"/>
+              <a:t> maintain compliance &amp; improve efficiency.  A new governance board is being created that’s co-chair by the informatics heads of the hospital and of the clinics.  I’m excited that this will speed up parts of our process for those studies that don’t require an IRB.</a:t>
+            </a:r>
+          </a:p>
+          <a:p>
+            <a:endParaRPr lang="en-US" baseline="0" dirty="0"/>
+          </a:p>
+          <a:p>
+            <a:r>
+              <a:rPr lang="en-US" baseline="0" dirty="0"/>
+              <a:t>[8 min cumulative]</a:t>
+            </a:r>
+            <a:endParaRPr lang="en-US" dirty="0"/>
+          </a:p>
+        </p:txBody>
+      </p:sp>
+      <p:sp>
+        <p:nvSpPr>
+          <p:cNvPr id="4" name="Slide Number Placeholder 3"/>
+          <p:cNvSpPr>
+            <a:spLocks noGrp="1"/>
+          </p:cNvSpPr>
+          <p:nvPr>
+            <p:ph type="sldNum" sz="quarter" idx="10"/>
+          </p:nvPr>
+        </p:nvSpPr>
+        <p:spPr/>
+        <p:txBody>
+          <a:bodyPr/>
+          <a:lstStyle/>
+          <a:p>
+            <a:fld id="{372B4D55-8C27-4C2C-B1CD-E79AEC43B316}" type="slidenum">
+              <a:rPr lang="en-US" smtClean="0"/>
+              <a:t>22</a:t>
             </a:fld>
             <a:endParaRPr lang="en-US"/>
           </a:p>
@@ -13836,8 +14006,8 @@
         </p:nvSpPr>
         <p:spPr>
           <a:xfrm>
-            <a:off x="510941" y="98561"/>
-            <a:ext cx="10515600" cy="806214"/>
+            <a:off x="565151" y="70785"/>
+            <a:ext cx="10515600" cy="640416"/>
           </a:xfrm>
         </p:spPr>
         <p:txBody>
@@ -13852,7 +14022,7 @@
                   <a:srgbClr val="0070C0"/>
                 </a:solidFill>
               </a:rPr>
-              <a:t>CDW Faculty &amp; Staff</a:t>
+              <a:t>Health Economics</a:t>
             </a:r>
           </a:p>
         </p:txBody>
@@ -13869,108 +14039,67 @@
         </p:nvSpPr>
         <p:spPr>
           <a:xfrm>
-            <a:off x="67377" y="904775"/>
-            <a:ext cx="11867949" cy="5953225"/>
+            <a:off x="565151" y="768351"/>
+            <a:ext cx="10814050" cy="5918200"/>
           </a:xfrm>
         </p:spPr>
         <p:txBody>
           <a:bodyPr>
-            <a:normAutofit/>
+            <a:noAutofit/>
           </a:bodyPr>
           <a:lstStyle/>
           <a:p>
-            <a:pPr marL="231775" indent="-231775">
-              <a:buNone/>
+            <a:pPr marL="457200" lvl="1" indent="-457200">
+              <a:buFontTx/>
+              <a:buChar char="-"/>
             </a:pPr>
             <a:r>
-              <a:rPr lang="en-US" sz="2200" b="1" dirty="0">
-                <a:latin typeface="+mj-lt"/>
-                <a:ea typeface="+mj-ea"/>
-                <a:cs typeface="+mj-cs"/>
-              </a:rPr>
-              <a:t>David Bard, PhD, Chief Research Information Officer</a:t>
-            </a:r>
-          </a:p>
-          <a:p>
-            <a:pPr marL="231775" indent="-231775">
-              <a:buNone/>
+              <a:rPr lang="en-US" sz="2800" dirty="0"/>
+              <a:t>Recent increase research demand</a:t>
+            </a:r>
+          </a:p>
+          <a:p>
+            <a:pPr marL="457200" lvl="1" indent="-457200">
+              <a:buFontTx/>
+              <a:buChar char="-"/>
             </a:pPr>
-            <a:r>
-              <a:rPr lang="en-US" sz="2200" b="1" dirty="0">
-                <a:latin typeface="+mj-lt"/>
-                <a:ea typeface="+mj-ea"/>
-                <a:cs typeface="+mj-cs"/>
-              </a:rPr>
-              <a:t>Will Beasley, PhD, BBMC Director of Informatics</a:t>
-            </a:r>
-          </a:p>
-          <a:p>
-            <a:pPr marL="231775" indent="-231775">
-              <a:buNone/>
+            <a:endParaRPr lang="en-US" sz="2800" dirty="0"/>
+          </a:p>
+          <a:p>
+            <a:pPr marL="457200" lvl="1" indent="-457200">
+              <a:buFontTx/>
+              <a:buChar char="-"/>
             </a:pPr>
             <a:r>
-              <a:rPr lang="en-US" sz="2200" b="1" dirty="0">
-                <a:latin typeface="+mj-lt"/>
-                <a:ea typeface="+mj-ea"/>
-                <a:cs typeface="+mj-cs"/>
-              </a:rPr>
-              <a:t>Lise DeShea, PhD </a:t>
-            </a:r>
-            <a:r>
-              <a:rPr lang="en-US" sz="2100" dirty="0">
-                <a:solidFill>
-                  <a:schemeClr val="bg1">
-                    <a:lumMod val="50000"/>
-                  </a:schemeClr>
-                </a:solidFill>
-              </a:rPr>
-              <a:t>is a senior research biostatistician who has worked on the OUHSC campus for more than 10 years, following her employment with OHCA as a statistician analyzing claims data in Quality Assurance. She has authored 3 statistics textbooks, has years of teaching experience, and expertise related to manuscript writing and presentation development. Lise joined the CDW team in July 2020.</a:t>
-            </a:r>
-          </a:p>
-          <a:p>
-            <a:pPr marL="231775" indent="-231775">
-              <a:buNone/>
+              <a:rPr lang="en-US" sz="2800" dirty="0"/>
+              <a:t>Especially with the new program in COPH</a:t>
+            </a:r>
+          </a:p>
+          <a:p>
+            <a:pPr marL="457200" lvl="1" indent="-457200">
+              <a:buFontTx/>
+              <a:buChar char="-"/>
             </a:pPr>
-            <a:r>
-              <a:rPr lang="en-US" sz="2200" b="1" dirty="0">
-                <a:latin typeface="+mj-lt"/>
-                <a:ea typeface="+mj-ea"/>
-                <a:cs typeface="+mj-cs"/>
-              </a:rPr>
-              <a:t>Geneva Marshall, MA </a:t>
-            </a:r>
-            <a:r>
-              <a:rPr lang="en-US" sz="2100" dirty="0">
-                <a:solidFill>
-                  <a:schemeClr val="bg1">
-                    <a:lumMod val="50000"/>
-                  </a:schemeClr>
-                </a:solidFill>
-              </a:rPr>
-              <a:t>joined the CRDW team in August 2020 after spending 8 years supporting academic research led by Drs. Bard and Beasley. Her experience includes the expansion and upkeep of a data pipeline using R and SQL to combine datasets for programs evaluation, as well as creating and streamlining a common set of procedures in R for data analysis. Geneva anticipates graduating OSU in May with a MS in Business Analytics specializing in Data Science.</a:t>
-            </a:r>
-          </a:p>
-          <a:p>
-            <a:pPr marL="231775" indent="-231775">
-              <a:buNone/>
+            <a:endParaRPr lang="en-US" sz="2800" dirty="0"/>
+          </a:p>
+          <a:p>
+            <a:pPr marL="457200" lvl="1" indent="-457200">
+              <a:buFontTx/>
+              <a:buChar char="-"/>
             </a:pPr>
             <a:r>
-              <a:rPr lang="en-US" sz="2200" b="1" dirty="0">
-                <a:latin typeface="+mj-lt"/>
-                <a:ea typeface="+mj-ea"/>
-                <a:cs typeface="+mj-cs"/>
-              </a:rPr>
-              <a:t>Ashley Thumann, MHA </a:t>
-            </a:r>
-            <a:r>
-              <a:rPr lang="en-US" sz="2100" dirty="0">
-                <a:solidFill>
-                  <a:schemeClr val="bg1">
-                    <a:lumMod val="50000"/>
-                  </a:schemeClr>
-                </a:solidFill>
-              </a:rPr>
-              <a:t>has 15 years of healthcare administration experience. Prior to joining the CRDW team in October 2017, she served as a Clinics Administrator and Quality Manager for OU Physicians. Ashley has end-user experience with many of the data systems on campus and is the CRDW’s primary liaison with investigators.</a:t>
+              <a:rPr lang="en-US" sz="2800" dirty="0"/>
+              <a:t>We’re currently identifying what pieces we have and need</a:t>
+            </a:r>
+          </a:p>
+          <a:p>
+            <a:pPr marL="914400" lvl="2" indent="-457200">
+              <a:buFontTx/>
+              <a:buChar char="-"/>
+            </a:pPr>
+            <a:r>
+              <a:rPr lang="en-US" sz="2800" dirty="0"/>
+              <a:t>Please tell us if you’re interested</a:t>
             </a:r>
           </a:p>
         </p:txBody>
@@ -13978,7 +14107,7 @@
     </p:spTree>
     <p:extLst>
       <p:ext uri="{BB962C8B-B14F-4D97-AF65-F5344CB8AC3E}">
-        <p14:creationId xmlns:p14="http://schemas.microsoft.com/office/powerpoint/2010/main" val="1348329825"/>
+        <p14:creationId xmlns:p14="http://schemas.microsoft.com/office/powerpoint/2010/main" val="3121077462"/>
       </p:ext>
     </p:extLst>
   </p:cSld>
@@ -14007,18 +14136,51 @@
       </p:grpSpPr>
       <p:sp>
         <p:nvSpPr>
-          <p:cNvPr id="13" name="Title 12"/>
+          <p:cNvPr id="2" name="Title 1"/>
           <p:cNvSpPr>
             <a:spLocks noGrp="1"/>
           </p:cNvSpPr>
           <p:nvPr>
-            <p:ph type="ctrTitle"/>
+            <p:ph type="title"/>
           </p:nvPr>
         </p:nvSpPr>
         <p:spPr>
           <a:xfrm>
-            <a:off x="1524000" y="1472339"/>
-            <a:ext cx="9144000" cy="1848377"/>
+            <a:off x="565151" y="70785"/>
+            <a:ext cx="10515600" cy="640416"/>
+          </a:xfrm>
+        </p:spPr>
+        <p:txBody>
+          <a:bodyPr>
+            <a:normAutofit/>
+          </a:bodyPr>
+          <a:lstStyle/>
+          <a:p>
+            <a:r>
+              <a:rPr lang="en-US" sz="3600" b="1" i="1" dirty="0">
+                <a:solidFill>
+                  <a:srgbClr val="0070C0"/>
+                </a:solidFill>
+              </a:rPr>
+              <a:t>N3C: National COVID Cohort Collaborative</a:t>
+            </a:r>
+          </a:p>
+        </p:txBody>
+      </p:sp>
+      <p:sp>
+        <p:nvSpPr>
+          <p:cNvPr id="3" name="Content Placeholder 2"/>
+          <p:cNvSpPr>
+            <a:spLocks noGrp="1"/>
+          </p:cNvSpPr>
+          <p:nvPr>
+            <p:ph idx="1"/>
+          </p:nvPr>
+        </p:nvSpPr>
+        <p:spPr>
+          <a:xfrm>
+            <a:off x="565151" y="768351"/>
+            <a:ext cx="10814050" cy="5918200"/>
           </a:xfrm>
         </p:spPr>
         <p:txBody>
@@ -14027,351 +14189,102 @@
           </a:bodyPr>
           <a:lstStyle/>
           <a:p>
-            <a:r>
-              <a:rPr lang="en-US" dirty="0"/>
-              <a:t>Thank you</a:t>
+            <a:pPr marL="457200" lvl="1" indent="-457200">
+              <a:buFontTx/>
+              <a:buChar char="-"/>
+            </a:pPr>
+            <a:r>
+              <a:rPr lang="en-US" sz="2800" dirty="0"/>
+              <a:t>60+ Institutions contribute EMR data in an OMOP model</a:t>
+            </a:r>
+          </a:p>
+          <a:p>
+            <a:pPr marL="457200" lvl="1" indent="-457200">
+              <a:buFontTx/>
+              <a:buChar char="-"/>
+            </a:pPr>
+            <a:endParaRPr lang="en-US" sz="2800" dirty="0"/>
+          </a:p>
+          <a:p>
+            <a:pPr marL="457200" lvl="1" indent="-457200">
+              <a:buFontTx/>
+              <a:buChar char="-"/>
+            </a:pPr>
+            <a:r>
+              <a:rPr lang="en-US" sz="2800" dirty="0"/>
+              <a:t>Datasets are accessible only through a browser to NIH’s cluster</a:t>
+            </a:r>
+          </a:p>
+          <a:p>
+            <a:pPr marL="914400" lvl="2" indent="-457200">
+              <a:buFontTx/>
+              <a:buChar char="-"/>
+            </a:pPr>
+            <a:r>
+              <a:rPr lang="en-US" sz="2400" dirty="0"/>
+              <a:t>Spark, Python, R</a:t>
+            </a:r>
+          </a:p>
+          <a:p>
+            <a:pPr marL="914400" lvl="2" indent="-457200">
+              <a:buFontTx/>
+              <a:buChar char="-"/>
+            </a:pPr>
+            <a:r>
+              <a:rPr lang="en-US" sz="2400" dirty="0"/>
+              <a:t>Lots of governance steps, but not as many as you’d think</a:t>
+            </a:r>
+          </a:p>
+          <a:p>
+            <a:pPr marL="914400" lvl="2" indent="-457200">
+              <a:buFontTx/>
+              <a:buChar char="-"/>
+            </a:pPr>
+            <a:endParaRPr lang="en-US" sz="2400" dirty="0"/>
+          </a:p>
+          <a:p>
+            <a:pPr marL="457200" lvl="1" indent="-457200">
+              <a:buFontTx/>
+              <a:buChar char="-"/>
+            </a:pPr>
+            <a:r>
+              <a:rPr lang="en-US" sz="2800" dirty="0"/>
+              <a:t>We believe this type of collaboration will be important in the future</a:t>
+            </a:r>
+          </a:p>
+          <a:p>
+            <a:pPr marL="457200" lvl="1" indent="-457200">
+              <a:buFontTx/>
+              <a:buChar char="-"/>
+            </a:pPr>
+            <a:endParaRPr lang="en-US" sz="2800" dirty="0"/>
+          </a:p>
+          <a:p>
+            <a:pPr marL="457200" lvl="1" indent="-457200">
+              <a:buFontTx/>
+              <a:buChar char="-"/>
+            </a:pPr>
+            <a:r>
+              <a:rPr lang="en-US" sz="2800" dirty="0"/>
+              <a:t>We’re recruiting OU collaborators</a:t>
+            </a:r>
+          </a:p>
+          <a:p>
+            <a:pPr marL="914400" lvl="2" indent="-457200">
+              <a:buFontTx/>
+              <a:buChar char="-"/>
+            </a:pPr>
+            <a:r>
+              <a:rPr lang="en-US" sz="2400" dirty="0"/>
+              <a:t>particularly statisticians and clinicians </a:t>
             </a:r>
           </a:p>
         </p:txBody>
       </p:sp>
-      <p:sp>
-        <p:nvSpPr>
-          <p:cNvPr id="14" name="Subtitle 13"/>
-          <p:cNvSpPr>
-            <a:spLocks noGrp="1"/>
-          </p:cNvSpPr>
-          <p:nvPr>
-            <p:ph type="subTitle" idx="1"/>
-          </p:nvPr>
-        </p:nvSpPr>
-        <p:spPr>
-          <a:xfrm>
-            <a:off x="1066800" y="3628725"/>
-            <a:ext cx="10058400" cy="2322256"/>
-          </a:xfrm>
-        </p:spPr>
-        <p:txBody>
-          <a:bodyPr>
-            <a:normAutofit fontScale="85000" lnSpcReduction="20000"/>
-          </a:bodyPr>
-          <a:lstStyle/>
-          <a:p>
-            <a:r>
-              <a:rPr lang="en-US" sz="2200" dirty="0"/>
-              <a:t>Will Beasley, PhD</a:t>
-            </a:r>
-          </a:p>
-          <a:p>
-            <a:r>
-              <a:rPr lang="en-US" sz="2200" dirty="0"/>
-              <a:t>Ashley Thumann, MHA</a:t>
-            </a:r>
-          </a:p>
-          <a:p>
-            <a:r>
-              <a:rPr lang="en-US" sz="2200" dirty="0"/>
-              <a:t>Geneva Marshall, MA</a:t>
-            </a:r>
-          </a:p>
-          <a:p>
-            <a:r>
-              <a:rPr lang="en-US" sz="2200" dirty="0"/>
-              <a:t>Lise DeShea, PhD</a:t>
-            </a:r>
-          </a:p>
-          <a:p>
-            <a:r>
-              <a:rPr lang="en-US" sz="2200" dirty="0"/>
-              <a:t>David Bard, PhD</a:t>
-            </a:r>
-          </a:p>
-          <a:p>
-            <a:r>
-              <a:rPr lang="en-US" sz="2200" dirty="0"/>
-              <a:t>University of Oklahoma HSC</a:t>
-            </a:r>
-          </a:p>
-          <a:p>
-            <a:r>
-              <a:rPr lang="en-US" sz="2200" dirty="0"/>
-              <a:t>Biomedical &amp; Behavioral Methodology Core (BBMC)</a:t>
-            </a:r>
-            <a:endParaRPr lang="en-US" dirty="0"/>
-          </a:p>
-        </p:txBody>
-      </p:sp>
-      <p:pic>
-        <p:nvPicPr>
-          <p:cNvPr id="15" name="Picture 14" descr="Unknown.jpeg"/>
-          <p:cNvPicPr>
-            <a:picLocks noChangeAspect="1"/>
-          </p:cNvPicPr>
-          <p:nvPr/>
-        </p:nvPicPr>
-        <p:blipFill>
-          <a:blip r:embed="rId3" cstate="print"/>
-          <a:stretch>
-            <a:fillRect/>
-          </a:stretch>
-        </p:blipFill>
-        <p:spPr>
-          <a:xfrm>
-            <a:off x="4724401" y="6333067"/>
-            <a:ext cx="2905125" cy="524933"/>
-          </a:xfrm>
-          <a:prstGeom prst="rect">
-            <a:avLst/>
-          </a:prstGeom>
-        </p:spPr>
-      </p:pic>
-      <p:sp>
-        <p:nvSpPr>
-          <p:cNvPr id="9" name="Rectangle 8"/>
-          <p:cNvSpPr/>
-          <p:nvPr/>
-        </p:nvSpPr>
-        <p:spPr>
-          <a:xfrm>
-            <a:off x="10677620" y="5543442"/>
-            <a:ext cx="1403889" cy="646331"/>
-          </a:xfrm>
-          <a:prstGeom prst="rect">
-            <a:avLst/>
-          </a:prstGeom>
-        </p:spPr>
-        <p:txBody>
-          <a:bodyPr wrap="square">
-            <a:spAutoFit/>
-          </a:bodyPr>
-          <a:lstStyle/>
-          <a:p>
-            <a:pPr algn="r"/>
-            <a:r>
-              <a:rPr lang="en-US" sz="1200" dirty="0">
-                <a:latin typeface="Calibri" panose="020F0502020204030204" pitchFamily="34" charset="0"/>
-                <a:ea typeface="Calibri" panose="020F0502020204030204" pitchFamily="34" charset="0"/>
-                <a:cs typeface="Times New Roman" panose="02020603050405020304" pitchFamily="18" charset="0"/>
-              </a:rPr>
-              <a:t>Award Numbers: UG1OD024950 U54GM104938</a:t>
-            </a:r>
-            <a:endParaRPr lang="en-US" sz="1200" dirty="0"/>
-          </a:p>
-        </p:txBody>
-      </p:sp>
-      <p:pic>
-        <p:nvPicPr>
-          <p:cNvPr id="10" name="Picture 9"/>
-          <p:cNvPicPr>
-            <a:picLocks noChangeAspect="1"/>
-          </p:cNvPicPr>
-          <p:nvPr/>
-        </p:nvPicPr>
-        <p:blipFill>
-          <a:blip r:embed="rId4"/>
-          <a:stretch>
-            <a:fillRect/>
-          </a:stretch>
-        </p:blipFill>
-        <p:spPr>
-          <a:xfrm>
-            <a:off x="36163" y="6290431"/>
-            <a:ext cx="2514600" cy="542925"/>
-          </a:xfrm>
-          <a:prstGeom prst="rect">
-            <a:avLst/>
-          </a:prstGeom>
-        </p:spPr>
-      </p:pic>
-      <p:pic>
-        <p:nvPicPr>
-          <p:cNvPr id="11" name="Picture 10"/>
-          <p:cNvPicPr>
-            <a:picLocks noChangeAspect="1"/>
-          </p:cNvPicPr>
-          <p:nvPr/>
-        </p:nvPicPr>
-        <p:blipFill>
-          <a:blip r:embed="rId5"/>
-          <a:stretch>
-            <a:fillRect/>
-          </a:stretch>
-        </p:blipFill>
-        <p:spPr>
-          <a:xfrm>
-            <a:off x="8871584" y="6189773"/>
-            <a:ext cx="3209925" cy="666750"/>
-          </a:xfrm>
-          <a:prstGeom prst="rect">
-            <a:avLst/>
-          </a:prstGeom>
-        </p:spPr>
-      </p:pic>
-      <p:pic>
-        <p:nvPicPr>
-          <p:cNvPr id="12" name="Picture 2" descr="BBMC"/>
-          <p:cNvPicPr>
-            <a:picLocks noChangeAspect="1" noChangeArrowheads="1"/>
-          </p:cNvPicPr>
-          <p:nvPr/>
-        </p:nvPicPr>
-        <p:blipFill>
-          <a:blip r:embed="rId6" cstate="print">
-            <a:extLst>
-              <a:ext uri="{28A0092B-C50C-407E-A947-70E740481C1C}">
-                <a14:useLocalDpi xmlns:a14="http://schemas.microsoft.com/office/drawing/2010/main" val="0"/>
-              </a:ext>
-            </a:extLst>
-          </a:blip>
-          <a:srcRect/>
-          <a:stretch>
-            <a:fillRect/>
-          </a:stretch>
-        </p:blipFill>
-        <p:spPr bwMode="auto">
-          <a:xfrm>
-            <a:off x="36163" y="90095"/>
-            <a:ext cx="1627222" cy="1627222"/>
-          </a:xfrm>
-          <a:prstGeom prst="rect">
-            <a:avLst/>
-          </a:prstGeom>
-          <a:noFill/>
-          <a:extLst>
-            <a:ext uri="{909E8E84-426E-40DD-AFC4-6F175D3DCCD1}">
-              <a14:hiddenFill xmlns:a14="http://schemas.microsoft.com/office/drawing/2010/main">
-                <a:solidFill>
-                  <a:srgbClr val="FFFFFF"/>
-                </a:solidFill>
-              </a14:hiddenFill>
-            </a:ext>
-          </a:extLst>
-        </p:spPr>
-      </p:pic>
-      <p:pic>
-        <p:nvPicPr>
-          <p:cNvPr id="16" name="Picture 4" descr="OSCTR"/>
-          <p:cNvPicPr>
-            <a:picLocks noChangeAspect="1" noChangeArrowheads="1"/>
-          </p:cNvPicPr>
-          <p:nvPr/>
-        </p:nvPicPr>
-        <p:blipFill>
-          <a:blip r:embed="rId7" cstate="print">
-            <a:extLst>
-              <a:ext uri="{28A0092B-C50C-407E-A947-70E740481C1C}">
-                <a14:useLocalDpi xmlns:a14="http://schemas.microsoft.com/office/drawing/2010/main" val="0"/>
-              </a:ext>
-            </a:extLst>
-          </a:blip>
-          <a:srcRect/>
-          <a:stretch>
-            <a:fillRect/>
-          </a:stretch>
-        </p:blipFill>
-        <p:spPr bwMode="auto">
-          <a:xfrm>
-            <a:off x="8761095" y="-61784"/>
-            <a:ext cx="3430905" cy="1402349"/>
-          </a:xfrm>
-          <a:prstGeom prst="rect">
-            <a:avLst/>
-          </a:prstGeom>
-          <a:noFill/>
-          <a:extLst>
-            <a:ext uri="{909E8E84-426E-40DD-AFC4-6F175D3DCCD1}">
-              <a14:hiddenFill xmlns:a14="http://schemas.microsoft.com/office/drawing/2010/main">
-                <a:solidFill>
-                  <a:srgbClr val="FFFFFF"/>
-                </a:solidFill>
-              </a14:hiddenFill>
-            </a:ext>
-          </a:extLst>
-        </p:spPr>
-      </p:pic>
-      <p:pic>
-        <p:nvPicPr>
-          <p:cNvPr id="17" name="Picture 16"/>
-          <p:cNvPicPr>
-            <a:picLocks noChangeAspect="1"/>
-          </p:cNvPicPr>
-          <p:nvPr/>
-        </p:nvPicPr>
-        <p:blipFill>
-          <a:blip r:embed="rId8">
-            <a:extLst>
-              <a:ext uri="{28A0092B-C50C-407E-A947-70E740481C1C}">
-                <a14:useLocalDpi xmlns:a14="http://schemas.microsoft.com/office/drawing/2010/main" val="0"/>
-              </a:ext>
-            </a:extLst>
-          </a:blip>
-          <a:stretch>
-            <a:fillRect/>
-          </a:stretch>
-        </p:blipFill>
-        <p:spPr>
-          <a:xfrm>
-            <a:off x="3473659" y="105632"/>
-            <a:ext cx="4906014" cy="1435009"/>
-          </a:xfrm>
-          <a:prstGeom prst="rect">
-            <a:avLst/>
-          </a:prstGeom>
-        </p:spPr>
-      </p:pic>
-      <p:pic>
-        <p:nvPicPr>
-          <p:cNvPr id="18" name="Picture 17" descr="C:\Users\tvanwago\Documents\OCTSI Logos\idea_transparent6.gif"/>
-          <p:cNvPicPr>
-            <a:picLocks noChangeAspect="1" noChangeArrowheads="1"/>
-          </p:cNvPicPr>
-          <p:nvPr/>
-        </p:nvPicPr>
-        <p:blipFill>
-          <a:blip r:embed="rId9" cstate="print">
-            <a:extLst>
-              <a:ext uri="{BEBA8EAE-BF5A-486C-A8C5-ECC9F3942E4B}">
-                <a14:imgProps xmlns:a14="http://schemas.microsoft.com/office/drawing/2010/main">
-                  <a14:imgLayer r:embed="rId10">
-                    <a14:imgEffect>
-                      <a14:brightnessContrast bright="10000"/>
-                    </a14:imgEffect>
-                  </a14:imgLayer>
-                </a14:imgProps>
-              </a:ext>
-              <a:ext uri="{28A0092B-C50C-407E-A947-70E740481C1C}">
-                <a14:useLocalDpi xmlns:a14="http://schemas.microsoft.com/office/drawing/2010/main" val="0"/>
-              </a:ext>
-            </a:extLst>
-          </a:blip>
-          <a:srcRect/>
-          <a:stretch>
-            <a:fillRect/>
-          </a:stretch>
-        </p:blipFill>
-        <p:spPr bwMode="auto">
-          <a:xfrm>
-            <a:off x="110491" y="4546377"/>
-            <a:ext cx="1810173" cy="1524000"/>
-          </a:xfrm>
-          <a:prstGeom prst="rect">
-            <a:avLst/>
-          </a:prstGeom>
-          <a:noFill/>
-          <a:extLst>
-            <a:ext uri="{909E8E84-426E-40DD-AFC4-6F175D3DCCD1}">
-              <a14:hiddenFill xmlns:a14="http://schemas.microsoft.com/office/drawing/2010/main">
-                <a:solidFill>
-                  <a:srgbClr val="FFFFFF"/>
-                </a:solidFill>
-              </a14:hiddenFill>
-            </a:ext>
-          </a:extLst>
-        </p:spPr>
-      </p:pic>
     </p:spTree>
     <p:extLst>
       <p:ext uri="{BB962C8B-B14F-4D97-AF65-F5344CB8AC3E}">
-        <p14:creationId xmlns:p14="http://schemas.microsoft.com/office/powerpoint/2010/main" val="4131642125"/>
+        <p14:creationId xmlns:p14="http://schemas.microsoft.com/office/powerpoint/2010/main" val="1806386402"/>
       </p:ext>
     </p:extLst>
   </p:cSld>
@@ -14384,14 +14297,6 @@
 <file path=ppt/slides/slide19.xml><?xml version="1.0" encoding="utf-8"?>
 <p:sld xmlns:a="http://schemas.openxmlformats.org/drawingml/2006/main" xmlns:r="http://schemas.openxmlformats.org/officeDocument/2006/relationships" xmlns:p="http://schemas.openxmlformats.org/presentationml/2006/main">
   <p:cSld>
-    <p:bg>
-      <p:bgPr>
-        <a:solidFill>
-          <a:schemeClr val="accent1"/>
-        </a:solidFill>
-        <a:effectLst/>
-      </p:bgPr>
-    </p:bg>
     <p:spTree>
       <p:nvGrpSpPr>
         <p:cNvPr id="1" name=""/>
@@ -14416,45 +14321,151 @@
             <p:ph type="title"/>
           </p:nvPr>
         </p:nvSpPr>
-        <p:spPr/>
+        <p:spPr>
+          <a:xfrm>
+            <a:off x="510941" y="98561"/>
+            <a:ext cx="10515600" cy="806214"/>
+          </a:xfrm>
+        </p:spPr>
         <p:txBody>
-          <a:bodyPr/>
+          <a:bodyPr>
+            <a:normAutofit/>
+          </a:bodyPr>
           <a:lstStyle/>
           <a:p>
             <a:r>
-              <a:rPr lang="en-US" dirty="0">
+              <a:rPr lang="en-US" sz="3600" b="1" i="1" dirty="0">
                 <a:solidFill>
-                  <a:schemeClr val="bg1"/>
+                  <a:srgbClr val="0070C0"/>
                 </a:solidFill>
               </a:rPr>
-              <a:t>Extra Slides</a:t>
+              <a:t>CDW Faculty &amp; Staff</a:t>
             </a:r>
           </a:p>
         </p:txBody>
       </p:sp>
       <p:sp>
         <p:nvSpPr>
-          <p:cNvPr id="3" name="Text Placeholder 2"/>
+          <p:cNvPr id="3" name="Content Placeholder 2"/>
           <p:cNvSpPr>
             <a:spLocks noGrp="1"/>
           </p:cNvSpPr>
           <p:nvPr>
-            <p:ph type="body" idx="1"/>
+            <p:ph idx="1"/>
           </p:nvPr>
         </p:nvSpPr>
-        <p:spPr/>
+        <p:spPr>
+          <a:xfrm>
+            <a:off x="67377" y="904775"/>
+            <a:ext cx="11867949" cy="5953225"/>
+          </a:xfrm>
+        </p:spPr>
         <p:txBody>
-          <a:bodyPr/>
+          <a:bodyPr>
+            <a:normAutofit/>
+          </a:bodyPr>
           <a:lstStyle/>
           <a:p>
-            <a:endParaRPr lang="en-US"/>
+            <a:pPr marL="231775" indent="-231775">
+              <a:buNone/>
+            </a:pPr>
+            <a:r>
+              <a:rPr lang="en-US" sz="2200" b="1" dirty="0">
+                <a:latin typeface="+mj-lt"/>
+                <a:ea typeface="+mj-ea"/>
+                <a:cs typeface="+mj-cs"/>
+              </a:rPr>
+              <a:t>David Bard, PhD, Chief Research Information Officer</a:t>
+            </a:r>
+          </a:p>
+          <a:p>
+            <a:pPr marL="231775" indent="-231775">
+              <a:buNone/>
+            </a:pPr>
+            <a:r>
+              <a:rPr lang="en-US" sz="2200" b="1" dirty="0">
+                <a:latin typeface="+mj-lt"/>
+                <a:ea typeface="+mj-ea"/>
+                <a:cs typeface="+mj-cs"/>
+              </a:rPr>
+              <a:t>Will Beasley, PhD, BBMC Director of Informatics</a:t>
+            </a:r>
+          </a:p>
+          <a:p>
+            <a:pPr marL="231775" indent="-231775">
+              <a:buNone/>
+            </a:pPr>
+            <a:r>
+              <a:rPr lang="en-US" sz="2200" b="1" dirty="0">
+                <a:latin typeface="+mj-lt"/>
+                <a:ea typeface="+mj-ea"/>
+                <a:cs typeface="+mj-cs"/>
+              </a:rPr>
+              <a:t>Lise DeShea, PhD </a:t>
+            </a:r>
+            <a:r>
+              <a:rPr lang="en-US" sz="2100" dirty="0">
+                <a:solidFill>
+                  <a:schemeClr val="bg1">
+                    <a:lumMod val="50000"/>
+                  </a:schemeClr>
+                </a:solidFill>
+              </a:rPr>
+              <a:t>is a senior research biostatistician who has worked on the OUHSC campus for more than 10 years, following her employment with OHCA as a statistician analyzing claims data in Quality Assurance. She has authored 3 statistics textbooks, has years of teaching experience, and expertise related to manuscript writing and presentation development. Lise joined the CDW team in July 2020.</a:t>
+            </a:r>
+          </a:p>
+          <a:p>
+            <a:pPr marL="231775" indent="-231775">
+              <a:buNone/>
+            </a:pPr>
+            <a:r>
+              <a:rPr lang="en-US" sz="2200" b="1" dirty="0">
+                <a:latin typeface="+mj-lt"/>
+                <a:ea typeface="+mj-ea"/>
+                <a:cs typeface="+mj-cs"/>
+              </a:rPr>
+              <a:t>Geneva Marshall, MA </a:t>
+            </a:r>
+            <a:r>
+              <a:rPr lang="en-US" sz="2100" dirty="0">
+                <a:solidFill>
+                  <a:schemeClr val="bg1">
+                    <a:lumMod val="50000"/>
+                  </a:schemeClr>
+                </a:solidFill>
+              </a:rPr>
+              <a:t>joined the CRDW team in August 2020 after spending 8 years supporting academic research led by Drs. Bard and Beasley. Her experience includes the expansion and upkeep of a data pipeline using R and SQL to combine datasets for programs evaluation, as well as creating and streamlining a common set of procedures in R for data analysis. Geneva anticipates graduating OSU in May with a MS in Business Analytics specializing in Data Science.</a:t>
+            </a:r>
+          </a:p>
+          <a:p>
+            <a:pPr marL="231775" indent="-231775">
+              <a:buNone/>
+            </a:pPr>
+            <a:r>
+              <a:rPr lang="en-US" sz="2200" b="1" dirty="0">
+                <a:latin typeface="+mj-lt"/>
+                <a:ea typeface="+mj-ea"/>
+                <a:cs typeface="+mj-cs"/>
+              </a:rPr>
+              <a:t>Ashley Thumann, MHA </a:t>
+            </a:r>
+            <a:r>
+              <a:rPr lang="en-US" sz="2100" dirty="0">
+                <a:solidFill>
+                  <a:schemeClr val="bg1">
+                    <a:lumMod val="50000"/>
+                  </a:schemeClr>
+                </a:solidFill>
+              </a:rPr>
+              <a:t>has 15 years of healthcare administration experience. Prior to joining the CRDW team in October 2017, she served as a Clinics Administrator and Quality Manager for OU Physicians. Ashley has end-user experience with many of the data systems on campus and is the CRDW’s primary liaison with investigators.</a:t>
+            </a:r>
           </a:p>
         </p:txBody>
       </p:sp>
     </p:spTree>
     <p:extLst>
       <p:ext uri="{BB962C8B-B14F-4D97-AF65-F5344CB8AC3E}">
-        <p14:creationId xmlns:p14="http://schemas.microsoft.com/office/powerpoint/2010/main" val="2060120136"/>
+        <p14:creationId xmlns:p14="http://schemas.microsoft.com/office/powerpoint/2010/main" val="1348329825"/>
       </p:ext>
     </p:extLst>
   </p:cSld>
@@ -14941,6 +14952,482 @@
 </file>
 
 <file path=ppt/slides/slide20.xml><?xml version="1.0" encoding="utf-8"?>
+<p:sld xmlns:a="http://schemas.openxmlformats.org/drawingml/2006/main" xmlns:r="http://schemas.openxmlformats.org/officeDocument/2006/relationships" xmlns:p="http://schemas.openxmlformats.org/presentationml/2006/main">
+  <p:cSld>
+    <p:spTree>
+      <p:nvGrpSpPr>
+        <p:cNvPr id="1" name=""/>
+        <p:cNvGrpSpPr/>
+        <p:nvPr/>
+      </p:nvGrpSpPr>
+      <p:grpSpPr>
+        <a:xfrm>
+          <a:off x="0" y="0"/>
+          <a:ext cx="0" cy="0"/>
+          <a:chOff x="0" y="0"/>
+          <a:chExt cx="0" cy="0"/>
+        </a:xfrm>
+      </p:grpSpPr>
+      <p:sp>
+        <p:nvSpPr>
+          <p:cNvPr id="13" name="Title 12"/>
+          <p:cNvSpPr>
+            <a:spLocks noGrp="1"/>
+          </p:cNvSpPr>
+          <p:nvPr>
+            <p:ph type="ctrTitle"/>
+          </p:nvPr>
+        </p:nvSpPr>
+        <p:spPr>
+          <a:xfrm>
+            <a:off x="1524000" y="1472339"/>
+            <a:ext cx="9144000" cy="1848377"/>
+          </a:xfrm>
+        </p:spPr>
+        <p:txBody>
+          <a:bodyPr>
+            <a:noAutofit/>
+          </a:bodyPr>
+          <a:lstStyle/>
+          <a:p>
+            <a:r>
+              <a:rPr lang="en-US" dirty="0"/>
+              <a:t>Thank you</a:t>
+            </a:r>
+          </a:p>
+        </p:txBody>
+      </p:sp>
+      <p:sp>
+        <p:nvSpPr>
+          <p:cNvPr id="14" name="Subtitle 13"/>
+          <p:cNvSpPr>
+            <a:spLocks noGrp="1"/>
+          </p:cNvSpPr>
+          <p:nvPr>
+            <p:ph type="subTitle" idx="1"/>
+          </p:nvPr>
+        </p:nvSpPr>
+        <p:spPr>
+          <a:xfrm>
+            <a:off x="1066800" y="3628725"/>
+            <a:ext cx="10058400" cy="2322256"/>
+          </a:xfrm>
+        </p:spPr>
+        <p:txBody>
+          <a:bodyPr>
+            <a:normAutofit fontScale="85000" lnSpcReduction="20000"/>
+          </a:bodyPr>
+          <a:lstStyle/>
+          <a:p>
+            <a:r>
+              <a:rPr lang="en-US" sz="2200" dirty="0"/>
+              <a:t>Will Beasley, PhD</a:t>
+            </a:r>
+          </a:p>
+          <a:p>
+            <a:r>
+              <a:rPr lang="en-US" sz="2200" dirty="0"/>
+              <a:t>Ashley Thumann, MHA</a:t>
+            </a:r>
+          </a:p>
+          <a:p>
+            <a:r>
+              <a:rPr lang="en-US" sz="2200" dirty="0"/>
+              <a:t>Geneva Marshall, MA</a:t>
+            </a:r>
+          </a:p>
+          <a:p>
+            <a:r>
+              <a:rPr lang="en-US" sz="2200" dirty="0"/>
+              <a:t>Lise DeShea, PhD</a:t>
+            </a:r>
+          </a:p>
+          <a:p>
+            <a:r>
+              <a:rPr lang="en-US" sz="2200" dirty="0"/>
+              <a:t>David Bard, PhD</a:t>
+            </a:r>
+          </a:p>
+          <a:p>
+            <a:r>
+              <a:rPr lang="en-US" sz="2200" dirty="0"/>
+              <a:t>University of Oklahoma HSC</a:t>
+            </a:r>
+          </a:p>
+          <a:p>
+            <a:r>
+              <a:rPr lang="en-US" sz="2200" dirty="0"/>
+              <a:t>Biomedical &amp; Behavioral Methodology Core (BBMC)</a:t>
+            </a:r>
+            <a:endParaRPr lang="en-US" dirty="0"/>
+          </a:p>
+        </p:txBody>
+      </p:sp>
+      <p:pic>
+        <p:nvPicPr>
+          <p:cNvPr id="15" name="Picture 14" descr="Unknown.jpeg"/>
+          <p:cNvPicPr>
+            <a:picLocks noChangeAspect="1"/>
+          </p:cNvPicPr>
+          <p:nvPr/>
+        </p:nvPicPr>
+        <p:blipFill>
+          <a:blip r:embed="rId3" cstate="print"/>
+          <a:stretch>
+            <a:fillRect/>
+          </a:stretch>
+        </p:blipFill>
+        <p:spPr>
+          <a:xfrm>
+            <a:off x="4724401" y="6333067"/>
+            <a:ext cx="2905125" cy="524933"/>
+          </a:xfrm>
+          <a:prstGeom prst="rect">
+            <a:avLst/>
+          </a:prstGeom>
+        </p:spPr>
+      </p:pic>
+      <p:sp>
+        <p:nvSpPr>
+          <p:cNvPr id="9" name="Rectangle 8"/>
+          <p:cNvSpPr/>
+          <p:nvPr/>
+        </p:nvSpPr>
+        <p:spPr>
+          <a:xfrm>
+            <a:off x="10677620" y="5543442"/>
+            <a:ext cx="1403889" cy="646331"/>
+          </a:xfrm>
+          <a:prstGeom prst="rect">
+            <a:avLst/>
+          </a:prstGeom>
+        </p:spPr>
+        <p:txBody>
+          <a:bodyPr wrap="square">
+            <a:spAutoFit/>
+          </a:bodyPr>
+          <a:lstStyle/>
+          <a:p>
+            <a:pPr algn="r"/>
+            <a:r>
+              <a:rPr lang="en-US" sz="1200" dirty="0">
+                <a:latin typeface="Calibri" panose="020F0502020204030204" pitchFamily="34" charset="0"/>
+                <a:ea typeface="Calibri" panose="020F0502020204030204" pitchFamily="34" charset="0"/>
+                <a:cs typeface="Times New Roman" panose="02020603050405020304" pitchFamily="18" charset="0"/>
+              </a:rPr>
+              <a:t>Award Numbers: UG1OD024950 U54GM104938</a:t>
+            </a:r>
+            <a:endParaRPr lang="en-US" sz="1200" dirty="0"/>
+          </a:p>
+        </p:txBody>
+      </p:sp>
+      <p:pic>
+        <p:nvPicPr>
+          <p:cNvPr id="10" name="Picture 9"/>
+          <p:cNvPicPr>
+            <a:picLocks noChangeAspect="1"/>
+          </p:cNvPicPr>
+          <p:nvPr/>
+        </p:nvPicPr>
+        <p:blipFill>
+          <a:blip r:embed="rId4"/>
+          <a:stretch>
+            <a:fillRect/>
+          </a:stretch>
+        </p:blipFill>
+        <p:spPr>
+          <a:xfrm>
+            <a:off x="36163" y="6290431"/>
+            <a:ext cx="2514600" cy="542925"/>
+          </a:xfrm>
+          <a:prstGeom prst="rect">
+            <a:avLst/>
+          </a:prstGeom>
+        </p:spPr>
+      </p:pic>
+      <p:pic>
+        <p:nvPicPr>
+          <p:cNvPr id="11" name="Picture 10"/>
+          <p:cNvPicPr>
+            <a:picLocks noChangeAspect="1"/>
+          </p:cNvPicPr>
+          <p:nvPr/>
+        </p:nvPicPr>
+        <p:blipFill>
+          <a:blip r:embed="rId5"/>
+          <a:stretch>
+            <a:fillRect/>
+          </a:stretch>
+        </p:blipFill>
+        <p:spPr>
+          <a:xfrm>
+            <a:off x="8871584" y="6189773"/>
+            <a:ext cx="3209925" cy="666750"/>
+          </a:xfrm>
+          <a:prstGeom prst="rect">
+            <a:avLst/>
+          </a:prstGeom>
+        </p:spPr>
+      </p:pic>
+      <p:pic>
+        <p:nvPicPr>
+          <p:cNvPr id="12" name="Picture 2" descr="BBMC"/>
+          <p:cNvPicPr>
+            <a:picLocks noChangeAspect="1" noChangeArrowheads="1"/>
+          </p:cNvPicPr>
+          <p:nvPr/>
+        </p:nvPicPr>
+        <p:blipFill>
+          <a:blip r:embed="rId6" cstate="print">
+            <a:extLst>
+              <a:ext uri="{28A0092B-C50C-407E-A947-70E740481C1C}">
+                <a14:useLocalDpi xmlns:a14="http://schemas.microsoft.com/office/drawing/2010/main" val="0"/>
+              </a:ext>
+            </a:extLst>
+          </a:blip>
+          <a:srcRect/>
+          <a:stretch>
+            <a:fillRect/>
+          </a:stretch>
+        </p:blipFill>
+        <p:spPr bwMode="auto">
+          <a:xfrm>
+            <a:off x="36163" y="90095"/>
+            <a:ext cx="1627222" cy="1627222"/>
+          </a:xfrm>
+          <a:prstGeom prst="rect">
+            <a:avLst/>
+          </a:prstGeom>
+          <a:noFill/>
+          <a:extLst>
+            <a:ext uri="{909E8E84-426E-40DD-AFC4-6F175D3DCCD1}">
+              <a14:hiddenFill xmlns:a14="http://schemas.microsoft.com/office/drawing/2010/main">
+                <a:solidFill>
+                  <a:srgbClr val="FFFFFF"/>
+                </a:solidFill>
+              </a14:hiddenFill>
+            </a:ext>
+          </a:extLst>
+        </p:spPr>
+      </p:pic>
+      <p:pic>
+        <p:nvPicPr>
+          <p:cNvPr id="16" name="Picture 4" descr="OSCTR"/>
+          <p:cNvPicPr>
+            <a:picLocks noChangeAspect="1" noChangeArrowheads="1"/>
+          </p:cNvPicPr>
+          <p:nvPr/>
+        </p:nvPicPr>
+        <p:blipFill>
+          <a:blip r:embed="rId7" cstate="print">
+            <a:extLst>
+              <a:ext uri="{28A0092B-C50C-407E-A947-70E740481C1C}">
+                <a14:useLocalDpi xmlns:a14="http://schemas.microsoft.com/office/drawing/2010/main" val="0"/>
+              </a:ext>
+            </a:extLst>
+          </a:blip>
+          <a:srcRect/>
+          <a:stretch>
+            <a:fillRect/>
+          </a:stretch>
+        </p:blipFill>
+        <p:spPr bwMode="auto">
+          <a:xfrm>
+            <a:off x="8761095" y="-61784"/>
+            <a:ext cx="3430905" cy="1402349"/>
+          </a:xfrm>
+          <a:prstGeom prst="rect">
+            <a:avLst/>
+          </a:prstGeom>
+          <a:noFill/>
+          <a:extLst>
+            <a:ext uri="{909E8E84-426E-40DD-AFC4-6F175D3DCCD1}">
+              <a14:hiddenFill xmlns:a14="http://schemas.microsoft.com/office/drawing/2010/main">
+                <a:solidFill>
+                  <a:srgbClr val="FFFFFF"/>
+                </a:solidFill>
+              </a14:hiddenFill>
+            </a:ext>
+          </a:extLst>
+        </p:spPr>
+      </p:pic>
+      <p:pic>
+        <p:nvPicPr>
+          <p:cNvPr id="17" name="Picture 16"/>
+          <p:cNvPicPr>
+            <a:picLocks noChangeAspect="1"/>
+          </p:cNvPicPr>
+          <p:nvPr/>
+        </p:nvPicPr>
+        <p:blipFill>
+          <a:blip r:embed="rId8">
+            <a:extLst>
+              <a:ext uri="{28A0092B-C50C-407E-A947-70E740481C1C}">
+                <a14:useLocalDpi xmlns:a14="http://schemas.microsoft.com/office/drawing/2010/main" val="0"/>
+              </a:ext>
+            </a:extLst>
+          </a:blip>
+          <a:stretch>
+            <a:fillRect/>
+          </a:stretch>
+        </p:blipFill>
+        <p:spPr>
+          <a:xfrm>
+            <a:off x="3473659" y="105632"/>
+            <a:ext cx="4906014" cy="1435009"/>
+          </a:xfrm>
+          <a:prstGeom prst="rect">
+            <a:avLst/>
+          </a:prstGeom>
+        </p:spPr>
+      </p:pic>
+      <p:pic>
+        <p:nvPicPr>
+          <p:cNvPr id="18" name="Picture 17" descr="C:\Users\tvanwago\Documents\OCTSI Logos\idea_transparent6.gif"/>
+          <p:cNvPicPr>
+            <a:picLocks noChangeAspect="1" noChangeArrowheads="1"/>
+          </p:cNvPicPr>
+          <p:nvPr/>
+        </p:nvPicPr>
+        <p:blipFill>
+          <a:blip r:embed="rId9" cstate="print">
+            <a:extLst>
+              <a:ext uri="{BEBA8EAE-BF5A-486C-A8C5-ECC9F3942E4B}">
+                <a14:imgProps xmlns:a14="http://schemas.microsoft.com/office/drawing/2010/main">
+                  <a14:imgLayer r:embed="rId10">
+                    <a14:imgEffect>
+                      <a14:brightnessContrast bright="10000"/>
+                    </a14:imgEffect>
+                  </a14:imgLayer>
+                </a14:imgProps>
+              </a:ext>
+              <a:ext uri="{28A0092B-C50C-407E-A947-70E740481C1C}">
+                <a14:useLocalDpi xmlns:a14="http://schemas.microsoft.com/office/drawing/2010/main" val="0"/>
+              </a:ext>
+            </a:extLst>
+          </a:blip>
+          <a:srcRect/>
+          <a:stretch>
+            <a:fillRect/>
+          </a:stretch>
+        </p:blipFill>
+        <p:spPr bwMode="auto">
+          <a:xfrm>
+            <a:off x="110491" y="4546377"/>
+            <a:ext cx="1810173" cy="1524000"/>
+          </a:xfrm>
+          <a:prstGeom prst="rect">
+            <a:avLst/>
+          </a:prstGeom>
+          <a:noFill/>
+          <a:extLst>
+            <a:ext uri="{909E8E84-426E-40DD-AFC4-6F175D3DCCD1}">
+              <a14:hiddenFill xmlns:a14="http://schemas.microsoft.com/office/drawing/2010/main">
+                <a:solidFill>
+                  <a:srgbClr val="FFFFFF"/>
+                </a:solidFill>
+              </a14:hiddenFill>
+            </a:ext>
+          </a:extLst>
+        </p:spPr>
+      </p:pic>
+    </p:spTree>
+    <p:extLst>
+      <p:ext uri="{BB962C8B-B14F-4D97-AF65-F5344CB8AC3E}">
+        <p14:creationId xmlns:p14="http://schemas.microsoft.com/office/powerpoint/2010/main" val="4131642125"/>
+      </p:ext>
+    </p:extLst>
+  </p:cSld>
+  <p:clrMapOvr>
+    <a:masterClrMapping/>
+  </p:clrMapOvr>
+</p:sld>
+</file>
+
+<file path=ppt/slides/slide21.xml><?xml version="1.0" encoding="utf-8"?>
+<p:sld xmlns:a="http://schemas.openxmlformats.org/drawingml/2006/main" xmlns:r="http://schemas.openxmlformats.org/officeDocument/2006/relationships" xmlns:p="http://schemas.openxmlformats.org/presentationml/2006/main">
+  <p:cSld>
+    <p:bg>
+      <p:bgPr>
+        <a:solidFill>
+          <a:schemeClr val="accent1"/>
+        </a:solidFill>
+        <a:effectLst/>
+      </p:bgPr>
+    </p:bg>
+    <p:spTree>
+      <p:nvGrpSpPr>
+        <p:cNvPr id="1" name=""/>
+        <p:cNvGrpSpPr/>
+        <p:nvPr/>
+      </p:nvGrpSpPr>
+      <p:grpSpPr>
+        <a:xfrm>
+          <a:off x="0" y="0"/>
+          <a:ext cx="0" cy="0"/>
+          <a:chOff x="0" y="0"/>
+          <a:chExt cx="0" cy="0"/>
+        </a:xfrm>
+      </p:grpSpPr>
+      <p:sp>
+        <p:nvSpPr>
+          <p:cNvPr id="2" name="Title 1"/>
+          <p:cNvSpPr>
+            <a:spLocks noGrp="1"/>
+          </p:cNvSpPr>
+          <p:nvPr>
+            <p:ph type="title"/>
+          </p:nvPr>
+        </p:nvSpPr>
+        <p:spPr/>
+        <p:txBody>
+          <a:bodyPr/>
+          <a:lstStyle/>
+          <a:p>
+            <a:r>
+              <a:rPr lang="en-US" dirty="0">
+                <a:solidFill>
+                  <a:schemeClr val="bg1"/>
+                </a:solidFill>
+              </a:rPr>
+              <a:t>Extra Slides</a:t>
+            </a:r>
+          </a:p>
+        </p:txBody>
+      </p:sp>
+      <p:sp>
+        <p:nvSpPr>
+          <p:cNvPr id="3" name="Text Placeholder 2"/>
+          <p:cNvSpPr>
+            <a:spLocks noGrp="1"/>
+          </p:cNvSpPr>
+          <p:nvPr>
+            <p:ph type="body" idx="1"/>
+          </p:nvPr>
+        </p:nvSpPr>
+        <p:spPr/>
+        <p:txBody>
+          <a:bodyPr/>
+          <a:lstStyle/>
+          <a:p>
+            <a:endParaRPr lang="en-US"/>
+          </a:p>
+        </p:txBody>
+      </p:sp>
+    </p:spTree>
+    <p:extLst>
+      <p:ext uri="{BB962C8B-B14F-4D97-AF65-F5344CB8AC3E}">
+        <p14:creationId xmlns:p14="http://schemas.microsoft.com/office/powerpoint/2010/main" val="2060120136"/>
+      </p:ext>
+    </p:extLst>
+  </p:cSld>
+  <p:clrMapOvr>
+    <a:masterClrMapping/>
+  </p:clrMapOvr>
+</p:sld>
+</file>
+
+<file path=ppt/slides/slide22.xml><?xml version="1.0" encoding="utf-8"?>
 <p:sld xmlns:a="http://schemas.openxmlformats.org/drawingml/2006/main" xmlns:r="http://schemas.openxmlformats.org/officeDocument/2006/relationships" xmlns:p="http://schemas.openxmlformats.org/presentationml/2006/main">
   <p:cSld>
     <p:spTree>

</xml_diff>